<commit_message>
Fix genba solution2 document.
</commit_message>
<xml_diff>
--- a/dbflute/etc/doc/ref/session/resource/GenbaSolution2-sc2008autumn-dbflute.pptx
+++ b/dbflute/etc/doc/ref/session/resource/GenbaSolution2-sc2008autumn-dbflute.pptx
@@ -236,7 +236,7 @@
             <a:fld id="{697514F1-BF3A-8244-8E24-39501B91FCA9}" type="datetimeFigureOut">
               <a:rPr lang="ja-JP" altLang="en-US" smtClean="0"/>
               <a:pPr/>
-              <a:t>08.9.5</a:t>
+              <a:t>08.9.7</a:t>
             </a:fld>
             <a:endParaRPr lang="ja-JP" altLang="en-US"/>
           </a:p>
@@ -399,7 +399,7 @@
             <a:fld id="{BCC37BBF-A47B-C644-A0B3-2AF340262DC0}" type="datetimeFigureOut">
               <a:rPr lang="ja-JP" altLang="en-US" smtClean="0"/>
               <a:pPr/>
-              <a:t>08.9.5</a:t>
+              <a:t>08.9.7</a:t>
             </a:fld>
             <a:endParaRPr lang="ja-JP" altLang="en-US"/>
           </a:p>
@@ -1014,7 +1014,7 @@
             <a:fld id="{F8B78B27-67EA-284E-B7DE-CA47CEF96BF3}" type="datetime1">
               <a:rPr lang="ja-JP" altLang="en-US" smtClean="0"/>
               <a:pPr/>
-              <a:t>08.9.5</a:t>
+              <a:t>08.9.7</a:t>
             </a:fld>
             <a:endParaRPr lang="ja-JP" altLang="en-US"/>
           </a:p>
@@ -1165,7 +1165,7 @@
             <a:fld id="{B07F40DE-A2F7-9040-AF94-3150A36DAF32}" type="datetime1">
               <a:rPr lang="ja-JP" altLang="en-US" smtClean="0"/>
               <a:pPr/>
-              <a:t>08.9.5</a:t>
+              <a:t>08.9.7</a:t>
             </a:fld>
             <a:endParaRPr lang="ja-JP" altLang="en-US"/>
           </a:p>
@@ -1752,7 +1752,7 @@
             <a:fld id="{7900A983-C81F-484C-AB24-3E409A9B0309}" type="datetime1">
               <a:rPr lang="ja-JP" altLang="en-US" smtClean="0"/>
               <a:pPr/>
-              <a:t>08.9.5</a:t>
+              <a:t>08.9.7</a:t>
             </a:fld>
             <a:endParaRPr lang="ja-JP" altLang="en-US"/>
           </a:p>
@@ -2222,7 +2222,7 @@
             <a:fld id="{49369E27-8AA6-8A4C-8F2F-BD9CFE65CFF9}" type="datetime1">
               <a:rPr lang="ja-JP" altLang="en-US" smtClean="0"/>
               <a:pPr/>
-              <a:t>08.9.5</a:t>
+              <a:t>08.9.7</a:t>
             </a:fld>
             <a:endParaRPr lang="ja-JP" altLang="en-US"/>
           </a:p>
@@ -2318,7 +2318,7 @@
             <a:fld id="{CA0B8717-2CE5-3D48-9724-6A74D3723472}" type="datetime1">
               <a:rPr lang="ja-JP" altLang="en-US" smtClean="0"/>
               <a:pPr/>
-              <a:t>08.9.5</a:t>
+              <a:t>08.9.7</a:t>
             </a:fld>
             <a:endParaRPr lang="ja-JP" altLang="en-US"/>
           </a:p>
@@ -2631,7 +2631,7 @@
             <a:fld id="{A7420916-367F-6347-9752-D3808E2C9DF8}" type="datetime1">
               <a:rPr lang="ja-JP" altLang="en-US" smtClean="0"/>
               <a:pPr/>
-              <a:t>08.9.5</a:t>
+              <a:t>08.9.7</a:t>
             </a:fld>
             <a:endParaRPr lang="ja-JP" altLang="en-US"/>
           </a:p>
@@ -2827,7 +2827,7 @@
             <a:fld id="{36F1D2E6-018C-0A41-B225-E525923353F9}" type="datetime1">
               <a:rPr lang="ja-JP" altLang="en-US" smtClean="0"/>
               <a:pPr/>
-              <a:t>08.9.5</a:t>
+              <a:t>08.9.7</a:t>
             </a:fld>
             <a:endParaRPr lang="ja-JP" altLang="en-US"/>
           </a:p>
@@ -3572,7 +3572,7 @@
             <a:fld id="{2F49DC6A-DB83-C64E-9E52-9AFA5AD018D7}" type="datetime1">
               <a:rPr lang="ja-JP" altLang="en-US" smtClean="0"/>
               <a:pPr/>
-              <a:t>08.9.5</a:t>
+              <a:t>08.9.7</a:t>
             </a:fld>
             <a:endParaRPr lang="ja-JP" altLang="en-US"/>
           </a:p>
@@ -3916,7 +3916,7 @@
             <a:fld id="{36ED8D3F-8256-3C42-8592-819D359B95D7}" type="datetime1">
               <a:rPr lang="ja-JP" altLang="en-US" smtClean="0"/>
               <a:pPr/>
-              <a:t>08.9.5</a:t>
+              <a:t>08.9.7</a:t>
             </a:fld>
             <a:endParaRPr lang="ja-JP" altLang="en-US"/>
           </a:p>
@@ -4519,7 +4519,7 @@
             <a:fld id="{490FEA9A-41F4-204E-A79D-1B36180FAAF8}" type="datetime1">
               <a:rPr lang="ja-JP" altLang="en-US" smtClean="0"/>
               <a:pPr/>
-              <a:t>08.9.5</a:t>
+              <a:t>08.9.7</a:t>
             </a:fld>
             <a:endParaRPr lang="ja-JP" altLang="en-US"/>
           </a:p>
@@ -4736,7 +4736,7 @@
             <a:fld id="{7F7C43F0-DFD5-354C-8FAE-68230B37B986}" type="datetime1">
               <a:rPr lang="ja-JP" altLang="en-US" smtClean="0"/>
               <a:pPr/>
-              <a:t>08.9.5</a:t>
+              <a:t>08.9.7</a:t>
             </a:fld>
             <a:endParaRPr lang="ja-JP" altLang="en-US"/>
           </a:p>
@@ -4939,7 +4939,7 @@
             <a:fld id="{913A2506-493B-D344-A783-4411DA3B51C6}" type="datetime1">
               <a:rPr lang="ja-JP" altLang="en-US" smtClean="0"/>
               <a:pPr/>
-              <a:t>08.9.5</a:t>
+              <a:t>08.9.7</a:t>
             </a:fld>
             <a:endParaRPr lang="ja-JP" altLang="en-US"/>
           </a:p>
@@ -5166,7 +5166,7 @@
             <a:fld id="{A8117D98-E012-1340-B59B-5CB4A353C1AC}" type="datetime1">
               <a:rPr lang="ja-JP" altLang="en-US" smtClean="0"/>
               <a:pPr/>
-              <a:t>08.9.5</a:t>
+              <a:t>08.9.7</a:t>
             </a:fld>
             <a:endParaRPr lang="ja-JP" altLang="en-US"/>
           </a:p>
@@ -5591,7 +5591,7 @@
             <a:fld id="{3A348B0A-8461-AC42-A115-63F264401103}" type="datetime1">
               <a:rPr lang="ja-JP" altLang="en-US" smtClean="0"/>
               <a:pPr/>
-              <a:t>08.9.5</a:t>
+              <a:t>08.9.7</a:t>
             </a:fld>
             <a:endParaRPr lang="ja-JP" altLang="en-US"/>
           </a:p>
@@ -5895,7 +5895,7 @@
             <a:fld id="{5E1B4DB0-F2B9-D04A-9DD7-6703AC7E7248}" type="datetime1">
               <a:rPr lang="ja-JP" altLang="en-US" smtClean="0"/>
               <a:pPr/>
-              <a:t>08.9.5</a:t>
+              <a:t>08.9.7</a:t>
             </a:fld>
             <a:endParaRPr lang="ja-JP" altLang="en-US"/>
           </a:p>
@@ -6302,7 +6302,7 @@
             <a:fld id="{D67B3AFA-E2BB-4B40-8DFD-5F43A75FECED}" type="datetime1">
               <a:rPr lang="ja-JP" altLang="en-US" smtClean="0"/>
               <a:pPr/>
-              <a:t>08.9.5</a:t>
+              <a:t>08.9.7</a:t>
             </a:fld>
             <a:endParaRPr lang="ja-JP" altLang="en-US"/>
           </a:p>
@@ -6698,7 +6698,7 @@
             <a:fld id="{C0E34838-0D8B-784A-8083-2BF0BCC81F31}" type="datetime1">
               <a:rPr lang="ja-JP" altLang="en-US" smtClean="0"/>
               <a:pPr/>
-              <a:t>08.9.5</a:t>
+              <a:t>08.9.7</a:t>
             </a:fld>
             <a:endParaRPr lang="ja-JP" altLang="en-US"/>
           </a:p>
@@ -7051,7 +7051,7 @@
             <a:fld id="{B214FFAD-D2AC-BA4E-94A6-AF1EF61CF5E3}" type="datetime1">
               <a:rPr lang="ja-JP" altLang="en-US" smtClean="0"/>
               <a:pPr/>
-              <a:t>08.9.5</a:t>
+              <a:t>08.9.7</a:t>
             </a:fld>
             <a:endParaRPr lang="ja-JP" altLang="en-US"/>
           </a:p>
@@ -7560,7 +7560,7 @@
             <a:fld id="{A505B7DA-7661-3B41-B158-5031F500DA1D}" type="datetime1">
               <a:rPr lang="ja-JP" altLang="en-US" smtClean="0"/>
               <a:pPr/>
-              <a:t>08.9.5</a:t>
+              <a:t>08.9.7</a:t>
             </a:fld>
             <a:endParaRPr lang="ja-JP" altLang="en-US"/>
           </a:p>
@@ -7892,7 +7892,7 @@
             <a:fld id="{D2DD3DBE-A7FC-A843-A5D2-64A57D5C6B0F}" type="datetime1">
               <a:rPr lang="ja-JP" altLang="en-US" smtClean="0"/>
               <a:pPr/>
-              <a:t>08.9.5</a:t>
+              <a:t>08.9.7</a:t>
             </a:fld>
             <a:endParaRPr lang="ja-JP" altLang="en-US"/>
           </a:p>
@@ -8254,7 +8254,7 @@
             <a:fld id="{19A5AFE0-9EBD-9B43-8D58-2BE7D375FB38}" type="datetime1">
               <a:rPr lang="ja-JP" altLang="en-US" smtClean="0"/>
               <a:pPr/>
-              <a:t>08.9.5</a:t>
+              <a:t>08.9.7</a:t>
             </a:fld>
             <a:endParaRPr lang="ja-JP" altLang="en-US"/>
           </a:p>
@@ -16683,7 +16683,7 @@
         <p:spPr>
           <a:xfrm>
             <a:off x="3581400" y="5637311"/>
-            <a:ext cx="4079174" cy="307777"/>
+            <a:ext cx="3848896" cy="307777"/>
           </a:xfrm>
           <a:prstGeom prst="rect">
             <a:avLst/>
@@ -16715,7 +16715,23 @@
           <a:p>
             <a:r>
               <a:rPr kumimoji="1" lang="ja-JP" altLang="en-US" sz="1400" dirty="0" smtClean="0"/>
-              <a:t>データにていぎされて入れ歯そちらが優先される</a:t>
+              <a:t>データ</a:t>
+            </a:r>
+            <a:r>
+              <a:rPr kumimoji="1" lang="ja-JP" altLang="en-US" sz="1400" dirty="0" smtClean="0"/>
+              <a:t>に</a:t>
+            </a:r>
+            <a:r>
+              <a:rPr kumimoji="1" lang="ja-JP" altLang="en-US" sz="1400" dirty="0" smtClean="0"/>
+              <a:t>定義されていれば</a:t>
+            </a:r>
+            <a:r>
+              <a:rPr kumimoji="1" lang="ja-JP" altLang="en-US" sz="1400" dirty="0" smtClean="0"/>
+              <a:t>そちら</a:t>
+            </a:r>
+            <a:r>
+              <a:rPr kumimoji="1" lang="ja-JP" altLang="en-US" sz="1400" dirty="0" smtClean="0"/>
+              <a:t>が優先される</a:t>
             </a:r>
             <a:endParaRPr kumimoji="1" lang="ja-JP" altLang="en-US" sz="1400" dirty="0"/>
           </a:p>

</xml_diff>